<commit_message>
Made some changes to the barchart experiment, according to previous pilot test results
</commit_message>
<xml_diff>
--- a/d3 Prototyping/User Evaluation/client/BarchartExperiment/Images/partialHintPath.pptx
+++ b/d3 Prototyping/User Evaluation/client/BarchartExperiment/Images/partialHintPath.pptx
@@ -9,6 +9,7 @@
     <p:sldId id="257" r:id="rId3"/>
     <p:sldId id="258" r:id="rId4"/>
     <p:sldId id="259" r:id="rId5"/>
+    <p:sldId id="261" r:id="rId6"/>
   </p:sldIdLst>
   <p:sldSz cx="9144000" cy="6858000" type="screen4x3"/>
   <p:notesSz cx="6858000" cy="9144000"/>
@@ -291,7 +292,7 @@
           <a:p>
             <a:fld id="{9EDD12FB-CA2E-40E7-86FF-113E71947391}" type="datetimeFigureOut">
               <a:rPr lang="en-CA" smtClean="0"/>
-              <a:t>01/11/2013</a:t>
+              <a:t>07/01/2014</a:t>
             </a:fld>
             <a:endParaRPr lang="en-CA"/>
           </a:p>
@@ -461,7 +462,7 @@
           <a:p>
             <a:fld id="{9EDD12FB-CA2E-40E7-86FF-113E71947391}" type="datetimeFigureOut">
               <a:rPr lang="en-CA" smtClean="0"/>
-              <a:t>01/11/2013</a:t>
+              <a:t>07/01/2014</a:t>
             </a:fld>
             <a:endParaRPr lang="en-CA"/>
           </a:p>
@@ -641,7 +642,7 @@
           <a:p>
             <a:fld id="{9EDD12FB-CA2E-40E7-86FF-113E71947391}" type="datetimeFigureOut">
               <a:rPr lang="en-CA" smtClean="0"/>
-              <a:t>01/11/2013</a:t>
+              <a:t>07/01/2014</a:t>
             </a:fld>
             <a:endParaRPr lang="en-CA"/>
           </a:p>
@@ -811,7 +812,7 @@
           <a:p>
             <a:fld id="{9EDD12FB-CA2E-40E7-86FF-113E71947391}" type="datetimeFigureOut">
               <a:rPr lang="en-CA" smtClean="0"/>
-              <a:t>01/11/2013</a:t>
+              <a:t>07/01/2014</a:t>
             </a:fld>
             <a:endParaRPr lang="en-CA"/>
           </a:p>
@@ -1057,7 +1058,7 @@
           <a:p>
             <a:fld id="{9EDD12FB-CA2E-40E7-86FF-113E71947391}" type="datetimeFigureOut">
               <a:rPr lang="en-CA" smtClean="0"/>
-              <a:t>01/11/2013</a:t>
+              <a:t>07/01/2014</a:t>
             </a:fld>
             <a:endParaRPr lang="en-CA"/>
           </a:p>
@@ -1345,7 +1346,7 @@
           <a:p>
             <a:fld id="{9EDD12FB-CA2E-40E7-86FF-113E71947391}" type="datetimeFigureOut">
               <a:rPr lang="en-CA" smtClean="0"/>
-              <a:t>01/11/2013</a:t>
+              <a:t>07/01/2014</a:t>
             </a:fld>
             <a:endParaRPr lang="en-CA"/>
           </a:p>
@@ -1767,7 +1768,7 @@
           <a:p>
             <a:fld id="{9EDD12FB-CA2E-40E7-86FF-113E71947391}" type="datetimeFigureOut">
               <a:rPr lang="en-CA" smtClean="0"/>
-              <a:t>01/11/2013</a:t>
+              <a:t>07/01/2014</a:t>
             </a:fld>
             <a:endParaRPr lang="en-CA"/>
           </a:p>
@@ -1885,7 +1886,7 @@
           <a:p>
             <a:fld id="{9EDD12FB-CA2E-40E7-86FF-113E71947391}" type="datetimeFigureOut">
               <a:rPr lang="en-CA" smtClean="0"/>
-              <a:t>01/11/2013</a:t>
+              <a:t>07/01/2014</a:t>
             </a:fld>
             <a:endParaRPr lang="en-CA"/>
           </a:p>
@@ -1980,7 +1981,7 @@
           <a:p>
             <a:fld id="{9EDD12FB-CA2E-40E7-86FF-113E71947391}" type="datetimeFigureOut">
               <a:rPr lang="en-CA" smtClean="0"/>
-              <a:t>01/11/2013</a:t>
+              <a:t>07/01/2014</a:t>
             </a:fld>
             <a:endParaRPr lang="en-CA"/>
           </a:p>
@@ -2257,7 +2258,7 @@
           <a:p>
             <a:fld id="{9EDD12FB-CA2E-40E7-86FF-113E71947391}" type="datetimeFigureOut">
               <a:rPr lang="en-CA" smtClean="0"/>
-              <a:t>01/11/2013</a:t>
+              <a:t>07/01/2014</a:t>
             </a:fld>
             <a:endParaRPr lang="en-CA"/>
           </a:p>
@@ -2510,7 +2511,7 @@
           <a:p>
             <a:fld id="{9EDD12FB-CA2E-40E7-86FF-113E71947391}" type="datetimeFigureOut">
               <a:rPr lang="en-CA" smtClean="0"/>
-              <a:t>01/11/2013</a:t>
+              <a:t>07/01/2014</a:t>
             </a:fld>
             <a:endParaRPr lang="en-CA"/>
           </a:p>
@@ -2723,7 +2724,7 @@
           <a:p>
             <a:fld id="{9EDD12FB-CA2E-40E7-86FF-113E71947391}" type="datetimeFigureOut">
               <a:rPr lang="en-CA" smtClean="0"/>
-              <a:t>01/11/2013</a:t>
+              <a:t>07/01/2014</a:t>
             </a:fld>
             <a:endParaRPr lang="en-CA"/>
           </a:p>
@@ -3888,14 +3889,6 @@
               </a:rPr>
               <a:t>to go directly to that year</a:t>
             </a:r>
-            <a:endParaRPr lang="en-CA" dirty="0" smtClean="0">
-              <a:solidFill>
-                <a:srgbClr val="EDEDED"/>
-              </a:solidFill>
-              <a:latin typeface="Verdana" panose="020B0604030504040204" pitchFamily="34" charset="0"/>
-              <a:ea typeface="Verdana" panose="020B0604030504040204" pitchFamily="34" charset="0"/>
-              <a:cs typeface="Verdana" panose="020B0604030504040204" pitchFamily="34" charset="0"/>
-            </a:endParaRPr>
           </a:p>
           <a:p>
             <a:endParaRPr lang="en-CA" u="sng" dirty="0">
@@ -4058,14 +4051,6 @@
               </a:rPr>
               <a:t>using the grey placeholder</a:t>
             </a:r>
-            <a:endParaRPr lang="en-CA" dirty="0" smtClean="0">
-              <a:solidFill>
-                <a:srgbClr val="EDEDED"/>
-              </a:solidFill>
-              <a:latin typeface="Verdana" panose="020B0604030504040204" pitchFamily="34" charset="0"/>
-              <a:ea typeface="Verdana" panose="020B0604030504040204" pitchFamily="34" charset="0"/>
-              <a:cs typeface="Verdana" panose="020B0604030504040204" pitchFamily="34" charset="0"/>
-            </a:endParaRPr>
           </a:p>
           <a:p>
             <a:endParaRPr lang="en-CA" u="sng" dirty="0">
@@ -4189,6 +4174,44 @@
     <p:extLst>
       <p:ext uri="{BB962C8B-B14F-4D97-AF65-F5344CB8AC3E}">
         <p14:creationId xmlns:p14="http://schemas.microsoft.com/office/powerpoint/2010/main" val="2250693173"/>
+      </p:ext>
+    </p:extLst>
+  </p:cSld>
+  <p:clrMapOvr>
+    <a:masterClrMapping/>
+  </p:clrMapOvr>
+</p:sld>
+</file>
+
+<file path=ppt/slides/slide5.xml><?xml version="1.0" encoding="utf-8"?>
+<p:sld xmlns:a="http://schemas.openxmlformats.org/drawingml/2006/main" xmlns:r="http://schemas.openxmlformats.org/officeDocument/2006/relationships" xmlns:p="http://schemas.openxmlformats.org/presentationml/2006/main">
+  <p:cSld>
+    <p:bg>
+      <p:bgPr>
+        <a:solidFill>
+          <a:srgbClr val="2C2D2D"/>
+        </a:solidFill>
+        <a:effectLst/>
+      </p:bgPr>
+    </p:bg>
+    <p:spTree>
+      <p:nvGrpSpPr>
+        <p:cNvPr id="1" name=""/>
+        <p:cNvGrpSpPr/>
+        <p:nvPr/>
+      </p:nvGrpSpPr>
+      <p:grpSpPr>
+        <a:xfrm>
+          <a:off x="0" y="0"/>
+          <a:ext cx="0" cy="0"/>
+          <a:chOff x="0" y="0"/>
+          <a:chExt cx="0" cy="0"/>
+        </a:xfrm>
+      </p:grpSpPr>
+    </p:spTree>
+    <p:extLst>
+      <p:ext uri="{BB962C8B-B14F-4D97-AF65-F5344CB8AC3E}">
+        <p14:creationId xmlns:p14="http://schemas.microsoft.com/office/powerpoint/2010/main" val="10355087"/>
       </p:ext>
     </p:extLst>
   </p:cSld>

</xml_diff>

<commit_message>
Started creating a dataset to use for the scatterplot experiment
</commit_message>
<xml_diff>
--- a/d3 Prototyping/User Evaluation/client/BarchartExperiment/Images/partialHintPath.pptx
+++ b/d3 Prototyping/User Evaluation/client/BarchartExperiment/Images/partialHintPath.pptx
@@ -9,7 +9,8 @@
     <p:sldId id="257" r:id="rId3"/>
     <p:sldId id="258" r:id="rId4"/>
     <p:sldId id="259" r:id="rId5"/>
-    <p:sldId id="261" r:id="rId6"/>
+    <p:sldId id="262" r:id="rId6"/>
+    <p:sldId id="261" r:id="rId7"/>
   </p:sldIdLst>
   <p:sldSz cx="9144000" cy="6858000" type="screen4x3"/>
   <p:notesSz cx="6858000" cy="9144000"/>
@@ -292,7 +293,7 @@
           <a:p>
             <a:fld id="{9EDD12FB-CA2E-40E7-86FF-113E71947391}" type="datetimeFigureOut">
               <a:rPr lang="en-CA" smtClean="0"/>
-              <a:t>07/01/2014</a:t>
+              <a:t>08/01/2014</a:t>
             </a:fld>
             <a:endParaRPr lang="en-CA"/>
           </a:p>
@@ -462,7 +463,7 @@
           <a:p>
             <a:fld id="{9EDD12FB-CA2E-40E7-86FF-113E71947391}" type="datetimeFigureOut">
               <a:rPr lang="en-CA" smtClean="0"/>
-              <a:t>07/01/2014</a:t>
+              <a:t>08/01/2014</a:t>
             </a:fld>
             <a:endParaRPr lang="en-CA"/>
           </a:p>
@@ -642,7 +643,7 @@
           <a:p>
             <a:fld id="{9EDD12FB-CA2E-40E7-86FF-113E71947391}" type="datetimeFigureOut">
               <a:rPr lang="en-CA" smtClean="0"/>
-              <a:t>07/01/2014</a:t>
+              <a:t>08/01/2014</a:t>
             </a:fld>
             <a:endParaRPr lang="en-CA"/>
           </a:p>
@@ -812,7 +813,7 @@
           <a:p>
             <a:fld id="{9EDD12FB-CA2E-40E7-86FF-113E71947391}" type="datetimeFigureOut">
               <a:rPr lang="en-CA" smtClean="0"/>
-              <a:t>07/01/2014</a:t>
+              <a:t>08/01/2014</a:t>
             </a:fld>
             <a:endParaRPr lang="en-CA"/>
           </a:p>
@@ -1058,7 +1059,7 @@
           <a:p>
             <a:fld id="{9EDD12FB-CA2E-40E7-86FF-113E71947391}" type="datetimeFigureOut">
               <a:rPr lang="en-CA" smtClean="0"/>
-              <a:t>07/01/2014</a:t>
+              <a:t>08/01/2014</a:t>
             </a:fld>
             <a:endParaRPr lang="en-CA"/>
           </a:p>
@@ -1346,7 +1347,7 @@
           <a:p>
             <a:fld id="{9EDD12FB-CA2E-40E7-86FF-113E71947391}" type="datetimeFigureOut">
               <a:rPr lang="en-CA" smtClean="0"/>
-              <a:t>07/01/2014</a:t>
+              <a:t>08/01/2014</a:t>
             </a:fld>
             <a:endParaRPr lang="en-CA"/>
           </a:p>
@@ -1768,7 +1769,7 @@
           <a:p>
             <a:fld id="{9EDD12FB-CA2E-40E7-86FF-113E71947391}" type="datetimeFigureOut">
               <a:rPr lang="en-CA" smtClean="0"/>
-              <a:t>07/01/2014</a:t>
+              <a:t>08/01/2014</a:t>
             </a:fld>
             <a:endParaRPr lang="en-CA"/>
           </a:p>
@@ -1886,7 +1887,7 @@
           <a:p>
             <a:fld id="{9EDD12FB-CA2E-40E7-86FF-113E71947391}" type="datetimeFigureOut">
               <a:rPr lang="en-CA" smtClean="0"/>
-              <a:t>07/01/2014</a:t>
+              <a:t>08/01/2014</a:t>
             </a:fld>
             <a:endParaRPr lang="en-CA"/>
           </a:p>
@@ -1981,7 +1982,7 @@
           <a:p>
             <a:fld id="{9EDD12FB-CA2E-40E7-86FF-113E71947391}" type="datetimeFigureOut">
               <a:rPr lang="en-CA" smtClean="0"/>
-              <a:t>07/01/2014</a:t>
+              <a:t>08/01/2014</a:t>
             </a:fld>
             <a:endParaRPr lang="en-CA"/>
           </a:p>
@@ -2258,7 +2259,7 @@
           <a:p>
             <a:fld id="{9EDD12FB-CA2E-40E7-86FF-113E71947391}" type="datetimeFigureOut">
               <a:rPr lang="en-CA" smtClean="0"/>
-              <a:t>07/01/2014</a:t>
+              <a:t>08/01/2014</a:t>
             </a:fld>
             <a:endParaRPr lang="en-CA"/>
           </a:p>
@@ -2511,7 +2512,7 @@
           <a:p>
             <a:fld id="{9EDD12FB-CA2E-40E7-86FF-113E71947391}" type="datetimeFigureOut">
               <a:rPr lang="en-CA" smtClean="0"/>
-              <a:t>07/01/2014</a:t>
+              <a:t>08/01/2014</a:t>
             </a:fld>
             <a:endParaRPr lang="en-CA"/>
           </a:p>
@@ -2724,7 +2725,7 @@
           <a:p>
             <a:fld id="{9EDD12FB-CA2E-40E7-86FF-113E71947391}" type="datetimeFigureOut">
               <a:rPr lang="en-CA" smtClean="0"/>
-              <a:t>07/01/2014</a:t>
+              <a:t>08/01/2014</a:t>
             </a:fld>
             <a:endParaRPr lang="en-CA"/>
           </a:p>
@@ -4211,6 +4212,268 @@
     </p:spTree>
     <p:extLst>
       <p:ext uri="{BB962C8B-B14F-4D97-AF65-F5344CB8AC3E}">
+        <p14:creationId xmlns:p14="http://schemas.microsoft.com/office/powerpoint/2010/main" val="941197271"/>
+      </p:ext>
+    </p:extLst>
+  </p:cSld>
+  <p:clrMapOvr>
+    <a:masterClrMapping/>
+  </p:clrMapOvr>
+</p:sld>
+</file>
+
+<file path=ppt/slides/slide6.xml><?xml version="1.0" encoding="utf-8"?>
+<p:sld xmlns:a="http://schemas.openxmlformats.org/drawingml/2006/main" xmlns:r="http://schemas.openxmlformats.org/officeDocument/2006/relationships" xmlns:p="http://schemas.openxmlformats.org/presentationml/2006/main">
+  <p:cSld>
+    <p:bg>
+      <p:bgPr>
+        <a:solidFill>
+          <a:srgbClr val="2C2D2D"/>
+        </a:solidFill>
+        <a:effectLst/>
+      </p:bgPr>
+    </p:bg>
+    <p:spTree>
+      <p:nvGrpSpPr>
+        <p:cNvPr id="1" name=""/>
+        <p:cNvGrpSpPr/>
+        <p:nvPr/>
+      </p:nvGrpSpPr>
+      <p:grpSpPr>
+        <a:xfrm>
+          <a:off x="0" y="0"/>
+          <a:ext cx="0" cy="0"/>
+          <a:chOff x="0" y="0"/>
+          <a:chExt cx="0" cy="0"/>
+        </a:xfrm>
+      </p:grpSpPr>
+      <p:pic>
+        <p:nvPicPr>
+          <p:cNvPr id="1027" name="Picture 3"/>
+          <p:cNvPicPr>
+            <a:picLocks noChangeAspect="1" noChangeArrowheads="1"/>
+          </p:cNvPicPr>
+          <p:nvPr/>
+        </p:nvPicPr>
+        <p:blipFill>
+          <a:blip r:embed="rId2">
+            <a:extLst>
+              <a:ext uri="{28A0092B-C50C-407E-A947-70E740481C1C}">
+                <a14:useLocalDpi xmlns:a14="http://schemas.microsoft.com/office/drawing/2010/main" val="0"/>
+              </a:ext>
+            </a:extLst>
+          </a:blip>
+          <a:srcRect/>
+          <a:stretch>
+            <a:fillRect/>
+          </a:stretch>
+        </p:blipFill>
+        <p:spPr bwMode="auto">
+          <a:xfrm>
+            <a:off x="899592" y="1196752"/>
+            <a:ext cx="5124450" cy="4876800"/>
+          </a:xfrm>
+          <a:prstGeom prst="rect">
+            <a:avLst/>
+          </a:prstGeom>
+          <a:noFill/>
+          <a:ln>
+            <a:noFill/>
+          </a:ln>
+          <a:extLst>
+            <a:ext uri="{909E8E84-426E-40DD-AFC4-6F175D3DCCD1}">
+              <a14:hiddenFill xmlns:a14="http://schemas.microsoft.com/office/drawing/2010/main">
+                <a:solidFill>
+                  <a:schemeClr val="accent1"/>
+                </a:solidFill>
+              </a14:hiddenFill>
+            </a:ext>
+            <a:ext uri="{91240B29-F687-4F45-9708-019B960494DF}">
+              <a14:hiddenLine xmlns:a14="http://schemas.microsoft.com/office/drawing/2010/main" w="9525">
+                <a:solidFill>
+                  <a:schemeClr val="tx1"/>
+                </a:solidFill>
+                <a:miter lim="800000"/>
+                <a:headEnd/>
+                <a:tailEnd/>
+              </a14:hiddenLine>
+            </a:ext>
+          </a:extLst>
+        </p:spPr>
+      </p:pic>
+      <p:sp>
+        <p:nvSpPr>
+          <p:cNvPr id="4" name="TextBox 3"/>
+          <p:cNvSpPr txBox="1"/>
+          <p:nvPr/>
+        </p:nvSpPr>
+        <p:spPr>
+          <a:xfrm>
+            <a:off x="251519" y="148801"/>
+            <a:ext cx="7708329" cy="646331"/>
+          </a:xfrm>
+          <a:prstGeom prst="rect">
+            <a:avLst/>
+          </a:prstGeom>
+          <a:noFill/>
+        </p:spPr>
+        <p:txBody>
+          <a:bodyPr wrap="none" rtlCol="0">
+            <a:spAutoFit/>
+          </a:bodyPr>
+          <a:lstStyle/>
+          <a:p>
+            <a:r>
+              <a:rPr lang="en-CA" dirty="0" smtClean="0">
+                <a:solidFill>
+                  <a:srgbClr val="EDEDED"/>
+                </a:solidFill>
+                <a:latin typeface="Verdana" panose="020B0604030504040204" pitchFamily="34" charset="0"/>
+                <a:ea typeface="Verdana" panose="020B0604030504040204" pitchFamily="34" charset="0"/>
+                <a:cs typeface="Verdana" panose="020B0604030504040204" pitchFamily="34" charset="0"/>
+              </a:rPr>
+              <a:t>Views are arranged in time from left to right, then top to bottom</a:t>
+            </a:r>
+            <a:endParaRPr lang="en-CA" dirty="0" smtClean="0">
+              <a:solidFill>
+                <a:srgbClr val="EDEDED"/>
+              </a:solidFill>
+              <a:latin typeface="Verdana" panose="020B0604030504040204" pitchFamily="34" charset="0"/>
+              <a:ea typeface="Verdana" panose="020B0604030504040204" pitchFamily="34" charset="0"/>
+              <a:cs typeface="Verdana" panose="020B0604030504040204" pitchFamily="34" charset="0"/>
+            </a:endParaRPr>
+          </a:p>
+          <a:p>
+            <a:endParaRPr lang="en-CA" u="sng" dirty="0">
+              <a:solidFill>
+                <a:srgbClr val="EDEDED"/>
+              </a:solidFill>
+              <a:latin typeface="Verdana" panose="020B0604030504040204" pitchFamily="34" charset="0"/>
+              <a:ea typeface="Verdana" panose="020B0604030504040204" pitchFamily="34" charset="0"/>
+              <a:cs typeface="Verdana" panose="020B0604030504040204" pitchFamily="34" charset="0"/>
+            </a:endParaRPr>
+          </a:p>
+        </p:txBody>
+      </p:sp>
+      <p:cxnSp>
+        <p:nvCxnSpPr>
+          <p:cNvPr id="5" name="Straight Arrow Connector 4"/>
+          <p:cNvCxnSpPr/>
+          <p:nvPr/>
+        </p:nvCxnSpPr>
+        <p:spPr>
+          <a:xfrm>
+            <a:off x="971600" y="1052736"/>
+            <a:ext cx="4896544" cy="0"/>
+          </a:xfrm>
+          <a:prstGeom prst="straightConnector1">
+            <a:avLst/>
+          </a:prstGeom>
+          <a:ln w="19050">
+            <a:solidFill>
+              <a:srgbClr val="EDEDED"/>
+            </a:solidFill>
+            <a:tailEnd type="arrow"/>
+          </a:ln>
+        </p:spPr>
+        <p:style>
+          <a:lnRef idx="1">
+            <a:schemeClr val="accent1"/>
+          </a:lnRef>
+          <a:fillRef idx="0">
+            <a:schemeClr val="accent1"/>
+          </a:fillRef>
+          <a:effectRef idx="0">
+            <a:schemeClr val="accent1"/>
+          </a:effectRef>
+          <a:fontRef idx="minor">
+            <a:schemeClr val="tx1"/>
+          </a:fontRef>
+        </p:style>
+      </p:cxnSp>
+      <p:cxnSp>
+        <p:nvCxnSpPr>
+          <p:cNvPr id="8" name="Straight Arrow Connector 7"/>
+          <p:cNvCxnSpPr/>
+          <p:nvPr/>
+        </p:nvCxnSpPr>
+        <p:spPr>
+          <a:xfrm rot="5400000">
+            <a:off x="-1692696" y="3635152"/>
+            <a:ext cx="4896544" cy="0"/>
+          </a:xfrm>
+          <a:prstGeom prst="straightConnector1">
+            <a:avLst/>
+          </a:prstGeom>
+          <a:ln w="19050">
+            <a:solidFill>
+              <a:srgbClr val="EDEDED"/>
+            </a:solidFill>
+            <a:tailEnd type="arrow"/>
+          </a:ln>
+        </p:spPr>
+        <p:style>
+          <a:lnRef idx="1">
+            <a:schemeClr val="accent1"/>
+          </a:lnRef>
+          <a:fillRef idx="0">
+            <a:schemeClr val="accent1"/>
+          </a:fillRef>
+          <a:effectRef idx="0">
+            <a:schemeClr val="accent1"/>
+          </a:effectRef>
+          <a:fontRef idx="minor">
+            <a:schemeClr val="tx1"/>
+          </a:fontRef>
+        </p:style>
+      </p:cxnSp>
+      <p:sp>
+        <p:nvSpPr>
+          <p:cNvPr id="9" name="TextBox 8"/>
+          <p:cNvSpPr txBox="1"/>
+          <p:nvPr/>
+        </p:nvSpPr>
+        <p:spPr>
+          <a:xfrm>
+            <a:off x="212189" y="827420"/>
+            <a:ext cx="753732" cy="369332"/>
+          </a:xfrm>
+          <a:prstGeom prst="rect">
+            <a:avLst/>
+          </a:prstGeom>
+          <a:noFill/>
+        </p:spPr>
+        <p:txBody>
+          <a:bodyPr wrap="none" rtlCol="0">
+            <a:spAutoFit/>
+          </a:bodyPr>
+          <a:lstStyle/>
+          <a:p>
+            <a:r>
+              <a:rPr lang="en-CA" dirty="0" smtClean="0">
+                <a:solidFill>
+                  <a:srgbClr val="EDEDED"/>
+                </a:solidFill>
+                <a:latin typeface="Verdana" panose="020B0604030504040204" pitchFamily="34" charset="0"/>
+                <a:ea typeface="Verdana" panose="020B0604030504040204" pitchFamily="34" charset="0"/>
+                <a:cs typeface="Verdana" panose="020B0604030504040204" pitchFamily="34" charset="0"/>
+              </a:rPr>
+              <a:t>Time</a:t>
+            </a:r>
+            <a:endParaRPr lang="en-CA" u="sng" dirty="0">
+              <a:solidFill>
+                <a:srgbClr val="EDEDED"/>
+              </a:solidFill>
+              <a:latin typeface="Verdana" panose="020B0604030504040204" pitchFamily="34" charset="0"/>
+              <a:ea typeface="Verdana" panose="020B0604030504040204" pitchFamily="34" charset="0"/>
+              <a:cs typeface="Verdana" panose="020B0604030504040204" pitchFamily="34" charset="0"/>
+            </a:endParaRPr>
+          </a:p>
+        </p:txBody>
+      </p:sp>
+    </p:spTree>
+    <p:extLst>
+      <p:ext uri="{BB962C8B-B14F-4D97-AF65-F5344CB8AC3E}">
         <p14:creationId xmlns:p14="http://schemas.microsoft.com/office/powerpoint/2010/main" val="10355087"/>
       </p:ext>
     </p:extLst>

</xml_diff>

<commit_message>
Added some images for distribution multiple object tasks in barchart experiment
</commit_message>
<xml_diff>
--- a/d3 Prototyping/User Evaluation/client/BarchartExperiment/Images/partialHintPath.pptx
+++ b/d3 Prototyping/User Evaluation/client/BarchartExperiment/Images/partialHintPath.pptx
@@ -11,6 +11,7 @@
     <p:sldId id="259" r:id="rId5"/>
     <p:sldId id="262" r:id="rId6"/>
     <p:sldId id="261" r:id="rId7"/>
+    <p:sldId id="263" r:id="rId8"/>
   </p:sldIdLst>
   <p:sldSz cx="9144000" cy="6858000" type="screen4x3"/>
   <p:notesSz cx="6858000" cy="9144000"/>
@@ -293,7 +294,7 @@
           <a:p>
             <a:fld id="{9EDD12FB-CA2E-40E7-86FF-113E71947391}" type="datetimeFigureOut">
               <a:rPr lang="en-CA" smtClean="0"/>
-              <a:t>08/01/2014</a:t>
+              <a:t>22/01/2014</a:t>
             </a:fld>
             <a:endParaRPr lang="en-CA"/>
           </a:p>
@@ -463,7 +464,7 @@
           <a:p>
             <a:fld id="{9EDD12FB-CA2E-40E7-86FF-113E71947391}" type="datetimeFigureOut">
               <a:rPr lang="en-CA" smtClean="0"/>
-              <a:t>08/01/2014</a:t>
+              <a:t>22/01/2014</a:t>
             </a:fld>
             <a:endParaRPr lang="en-CA"/>
           </a:p>
@@ -643,7 +644,7 @@
           <a:p>
             <a:fld id="{9EDD12FB-CA2E-40E7-86FF-113E71947391}" type="datetimeFigureOut">
               <a:rPr lang="en-CA" smtClean="0"/>
-              <a:t>08/01/2014</a:t>
+              <a:t>22/01/2014</a:t>
             </a:fld>
             <a:endParaRPr lang="en-CA"/>
           </a:p>
@@ -813,7 +814,7 @@
           <a:p>
             <a:fld id="{9EDD12FB-CA2E-40E7-86FF-113E71947391}" type="datetimeFigureOut">
               <a:rPr lang="en-CA" smtClean="0"/>
-              <a:t>08/01/2014</a:t>
+              <a:t>22/01/2014</a:t>
             </a:fld>
             <a:endParaRPr lang="en-CA"/>
           </a:p>
@@ -1059,7 +1060,7 @@
           <a:p>
             <a:fld id="{9EDD12FB-CA2E-40E7-86FF-113E71947391}" type="datetimeFigureOut">
               <a:rPr lang="en-CA" smtClean="0"/>
-              <a:t>08/01/2014</a:t>
+              <a:t>22/01/2014</a:t>
             </a:fld>
             <a:endParaRPr lang="en-CA"/>
           </a:p>
@@ -1347,7 +1348,7 @@
           <a:p>
             <a:fld id="{9EDD12FB-CA2E-40E7-86FF-113E71947391}" type="datetimeFigureOut">
               <a:rPr lang="en-CA" smtClean="0"/>
-              <a:t>08/01/2014</a:t>
+              <a:t>22/01/2014</a:t>
             </a:fld>
             <a:endParaRPr lang="en-CA"/>
           </a:p>
@@ -1769,7 +1770,7 @@
           <a:p>
             <a:fld id="{9EDD12FB-CA2E-40E7-86FF-113E71947391}" type="datetimeFigureOut">
               <a:rPr lang="en-CA" smtClean="0"/>
-              <a:t>08/01/2014</a:t>
+              <a:t>22/01/2014</a:t>
             </a:fld>
             <a:endParaRPr lang="en-CA"/>
           </a:p>
@@ -1887,7 +1888,7 @@
           <a:p>
             <a:fld id="{9EDD12FB-CA2E-40E7-86FF-113E71947391}" type="datetimeFigureOut">
               <a:rPr lang="en-CA" smtClean="0"/>
-              <a:t>08/01/2014</a:t>
+              <a:t>22/01/2014</a:t>
             </a:fld>
             <a:endParaRPr lang="en-CA"/>
           </a:p>
@@ -1982,7 +1983,7 @@
           <a:p>
             <a:fld id="{9EDD12FB-CA2E-40E7-86FF-113E71947391}" type="datetimeFigureOut">
               <a:rPr lang="en-CA" smtClean="0"/>
-              <a:t>08/01/2014</a:t>
+              <a:t>22/01/2014</a:t>
             </a:fld>
             <a:endParaRPr lang="en-CA"/>
           </a:p>
@@ -2259,7 +2260,7 @@
           <a:p>
             <a:fld id="{9EDD12FB-CA2E-40E7-86FF-113E71947391}" type="datetimeFigureOut">
               <a:rPr lang="en-CA" smtClean="0"/>
-              <a:t>08/01/2014</a:t>
+              <a:t>22/01/2014</a:t>
             </a:fld>
             <a:endParaRPr lang="en-CA"/>
           </a:p>
@@ -2512,7 +2513,7 @@
           <a:p>
             <a:fld id="{9EDD12FB-CA2E-40E7-86FF-113E71947391}" type="datetimeFigureOut">
               <a:rPr lang="en-CA" smtClean="0"/>
-              <a:t>08/01/2014</a:t>
+              <a:t>22/01/2014</a:t>
             </a:fld>
             <a:endParaRPr lang="en-CA"/>
           </a:p>
@@ -2725,7 +2726,7 @@
           <a:p>
             <a:fld id="{9EDD12FB-CA2E-40E7-86FF-113E71947391}" type="datetimeFigureOut">
               <a:rPr lang="en-CA" smtClean="0"/>
-              <a:t>08/01/2014</a:t>
+              <a:t>22/01/2014</a:t>
             </a:fld>
             <a:endParaRPr lang="en-CA"/>
           </a:p>
@@ -4334,14 +4335,6 @@
               </a:rPr>
               <a:t>Views are arranged in time from left to right, then top to bottom</a:t>
             </a:r>
-            <a:endParaRPr lang="en-CA" dirty="0" smtClean="0">
-              <a:solidFill>
-                <a:srgbClr val="EDEDED"/>
-              </a:solidFill>
-              <a:latin typeface="Verdana" panose="020B0604030504040204" pitchFamily="34" charset="0"/>
-              <a:ea typeface="Verdana" panose="020B0604030504040204" pitchFamily="34" charset="0"/>
-              <a:cs typeface="Verdana" panose="020B0604030504040204" pitchFamily="34" charset="0"/>
-            </a:endParaRPr>
           </a:p>
           <a:p>
             <a:endParaRPr lang="en-CA" u="sng" dirty="0">
@@ -4475,6 +4468,236 @@
     <p:extLst>
       <p:ext uri="{BB962C8B-B14F-4D97-AF65-F5344CB8AC3E}">
         <p14:creationId xmlns:p14="http://schemas.microsoft.com/office/powerpoint/2010/main" val="10355087"/>
+      </p:ext>
+    </p:extLst>
+  </p:cSld>
+  <p:clrMapOvr>
+    <a:masterClrMapping/>
+  </p:clrMapOvr>
+</p:sld>
+</file>
+
+<file path=ppt/slides/slide7.xml><?xml version="1.0" encoding="utf-8"?>
+<p:sld xmlns:a="http://schemas.openxmlformats.org/drawingml/2006/main" xmlns:r="http://schemas.openxmlformats.org/officeDocument/2006/relationships" xmlns:p="http://schemas.openxmlformats.org/presentationml/2006/main">
+  <p:cSld>
+    <p:bg>
+      <p:bgPr>
+        <a:solidFill>
+          <a:srgbClr val="2C2D2D"/>
+        </a:solidFill>
+        <a:effectLst/>
+      </p:bgPr>
+    </p:bg>
+    <p:spTree>
+      <p:nvGrpSpPr>
+        <p:cNvPr id="1" name=""/>
+        <p:cNvGrpSpPr/>
+        <p:nvPr/>
+      </p:nvGrpSpPr>
+      <p:grpSpPr>
+        <a:xfrm>
+          <a:off x="0" y="0"/>
+          <a:ext cx="0" cy="0"/>
+          <a:chOff x="0" y="0"/>
+          <a:chExt cx="0" cy="0"/>
+        </a:xfrm>
+      </p:grpSpPr>
+      <p:sp>
+        <p:nvSpPr>
+          <p:cNvPr id="4" name="TextBox 3"/>
+          <p:cNvSpPr txBox="1"/>
+          <p:nvPr/>
+        </p:nvSpPr>
+        <p:spPr>
+          <a:xfrm>
+            <a:off x="251519" y="148801"/>
+            <a:ext cx="7708329" cy="646331"/>
+          </a:xfrm>
+          <a:prstGeom prst="rect">
+            <a:avLst/>
+          </a:prstGeom>
+          <a:noFill/>
+        </p:spPr>
+        <p:txBody>
+          <a:bodyPr wrap="none" rtlCol="0">
+            <a:spAutoFit/>
+          </a:bodyPr>
+          <a:lstStyle/>
+          <a:p>
+            <a:r>
+              <a:rPr lang="en-CA" dirty="0" smtClean="0">
+                <a:solidFill>
+                  <a:srgbClr val="EDEDED"/>
+                </a:solidFill>
+                <a:latin typeface="Verdana" panose="020B0604030504040204" pitchFamily="34" charset="0"/>
+                <a:ea typeface="Verdana" panose="020B0604030504040204" pitchFamily="34" charset="0"/>
+                <a:cs typeface="Verdana" panose="020B0604030504040204" pitchFamily="34" charset="0"/>
+              </a:rPr>
+              <a:t>Views are arranged in time from left to right, then top to bottom</a:t>
+            </a:r>
+          </a:p>
+          <a:p>
+            <a:endParaRPr lang="en-CA" u="sng" dirty="0">
+              <a:solidFill>
+                <a:srgbClr val="EDEDED"/>
+              </a:solidFill>
+              <a:latin typeface="Verdana" panose="020B0604030504040204" pitchFamily="34" charset="0"/>
+              <a:ea typeface="Verdana" panose="020B0604030504040204" pitchFamily="34" charset="0"/>
+              <a:cs typeface="Verdana" panose="020B0604030504040204" pitchFamily="34" charset="0"/>
+            </a:endParaRPr>
+          </a:p>
+        </p:txBody>
+      </p:sp>
+      <p:cxnSp>
+        <p:nvCxnSpPr>
+          <p:cNvPr id="5" name="Straight Arrow Connector 4"/>
+          <p:cNvCxnSpPr/>
+          <p:nvPr/>
+        </p:nvCxnSpPr>
+        <p:spPr>
+          <a:xfrm>
+            <a:off x="971600" y="1052736"/>
+            <a:ext cx="4896544" cy="0"/>
+          </a:xfrm>
+          <a:prstGeom prst="straightConnector1">
+            <a:avLst/>
+          </a:prstGeom>
+          <a:ln w="19050">
+            <a:solidFill>
+              <a:srgbClr val="EDEDED"/>
+            </a:solidFill>
+            <a:tailEnd type="arrow"/>
+          </a:ln>
+        </p:spPr>
+        <p:style>
+          <a:lnRef idx="1">
+            <a:schemeClr val="accent1"/>
+          </a:lnRef>
+          <a:fillRef idx="0">
+            <a:schemeClr val="accent1"/>
+          </a:fillRef>
+          <a:effectRef idx="0">
+            <a:schemeClr val="accent1"/>
+          </a:effectRef>
+          <a:fontRef idx="minor">
+            <a:schemeClr val="tx1"/>
+          </a:fontRef>
+        </p:style>
+      </p:cxnSp>
+      <p:cxnSp>
+        <p:nvCxnSpPr>
+          <p:cNvPr id="8" name="Straight Arrow Connector 7"/>
+          <p:cNvCxnSpPr/>
+          <p:nvPr/>
+        </p:nvCxnSpPr>
+        <p:spPr>
+          <a:xfrm rot="5400000">
+            <a:off x="-1692696" y="3635152"/>
+            <a:ext cx="4896544" cy="0"/>
+          </a:xfrm>
+          <a:prstGeom prst="straightConnector1">
+            <a:avLst/>
+          </a:prstGeom>
+          <a:ln w="19050">
+            <a:solidFill>
+              <a:srgbClr val="EDEDED"/>
+            </a:solidFill>
+            <a:tailEnd type="arrow"/>
+          </a:ln>
+        </p:spPr>
+        <p:style>
+          <a:lnRef idx="1">
+            <a:schemeClr val="accent1"/>
+          </a:lnRef>
+          <a:fillRef idx="0">
+            <a:schemeClr val="accent1"/>
+          </a:fillRef>
+          <a:effectRef idx="0">
+            <a:schemeClr val="accent1"/>
+          </a:effectRef>
+          <a:fontRef idx="minor">
+            <a:schemeClr val="tx1"/>
+          </a:fontRef>
+        </p:style>
+      </p:cxnSp>
+      <p:sp>
+        <p:nvSpPr>
+          <p:cNvPr id="9" name="TextBox 8"/>
+          <p:cNvSpPr txBox="1"/>
+          <p:nvPr/>
+        </p:nvSpPr>
+        <p:spPr>
+          <a:xfrm>
+            <a:off x="212189" y="827420"/>
+            <a:ext cx="753732" cy="369332"/>
+          </a:xfrm>
+          <a:prstGeom prst="rect">
+            <a:avLst/>
+          </a:prstGeom>
+          <a:noFill/>
+        </p:spPr>
+        <p:txBody>
+          <a:bodyPr wrap="none" rtlCol="0">
+            <a:spAutoFit/>
+          </a:bodyPr>
+          <a:lstStyle/>
+          <a:p>
+            <a:r>
+              <a:rPr lang="en-CA" dirty="0" smtClean="0">
+                <a:solidFill>
+                  <a:srgbClr val="EDEDED"/>
+                </a:solidFill>
+                <a:latin typeface="Verdana" panose="020B0604030504040204" pitchFamily="34" charset="0"/>
+                <a:ea typeface="Verdana" panose="020B0604030504040204" pitchFamily="34" charset="0"/>
+                <a:cs typeface="Verdana" panose="020B0604030504040204" pitchFamily="34" charset="0"/>
+              </a:rPr>
+              <a:t>Time</a:t>
+            </a:r>
+            <a:endParaRPr lang="en-CA" u="sng" dirty="0">
+              <a:solidFill>
+                <a:srgbClr val="EDEDED"/>
+              </a:solidFill>
+              <a:latin typeface="Verdana" panose="020B0604030504040204" pitchFamily="34" charset="0"/>
+              <a:ea typeface="Verdana" panose="020B0604030504040204" pitchFamily="34" charset="0"/>
+              <a:cs typeface="Verdana" panose="020B0604030504040204" pitchFamily="34" charset="0"/>
+            </a:endParaRPr>
+          </a:p>
+        </p:txBody>
+      </p:sp>
+      <p:pic>
+        <p:nvPicPr>
+          <p:cNvPr id="2" name="Picture 1"/>
+          <p:cNvPicPr>
+            <a:picLocks noChangeAspect="1"/>
+          </p:cNvPicPr>
+          <p:nvPr/>
+        </p:nvPicPr>
+        <p:blipFill>
+          <a:blip r:embed="rId2">
+            <a:extLst>
+              <a:ext uri="{28A0092B-C50C-407E-A947-70E740481C1C}">
+                <a14:useLocalDpi xmlns:a14="http://schemas.microsoft.com/office/drawing/2010/main" val="0"/>
+              </a:ext>
+            </a:extLst>
+          </a:blip>
+          <a:stretch>
+            <a:fillRect/>
+          </a:stretch>
+        </p:blipFill>
+        <p:spPr>
+          <a:xfrm>
+            <a:off x="831227" y="1161971"/>
+            <a:ext cx="5521828" cy="5495195"/>
+          </a:xfrm>
+          <a:prstGeom prst="rect">
+            <a:avLst/>
+          </a:prstGeom>
+        </p:spPr>
+      </p:pic>
+    </p:spTree>
+    <p:extLst>
+      <p:ext uri="{BB962C8B-B14F-4D97-AF65-F5344CB8AC3E}">
+        <p14:creationId xmlns:p14="http://schemas.microsoft.com/office/powerpoint/2010/main" val="815251456"/>
       </p:ext>
     </p:extLst>
   </p:cSld>

</xml_diff>

<commit_message>
Made the tutorials for the dimp and slider technique interactive, such that the participant can practice using the techniques before starting the practice tasks
</commit_message>
<xml_diff>
--- a/d3 Prototyping/User Evaluation/client/BarchartExperiment/Images/partialHintPath.pptx
+++ b/d3 Prototyping/User Evaluation/client/BarchartExperiment/Images/partialHintPath.pptx
@@ -294,7 +294,7 @@
           <a:p>
             <a:fld id="{9EDD12FB-CA2E-40E7-86FF-113E71947391}" type="datetimeFigureOut">
               <a:rPr lang="en-CA" smtClean="0"/>
-              <a:t>22/01/2014</a:t>
+              <a:t>24/01/2014</a:t>
             </a:fld>
             <a:endParaRPr lang="en-CA"/>
           </a:p>
@@ -464,7 +464,7 @@
           <a:p>
             <a:fld id="{9EDD12FB-CA2E-40E7-86FF-113E71947391}" type="datetimeFigureOut">
               <a:rPr lang="en-CA" smtClean="0"/>
-              <a:t>22/01/2014</a:t>
+              <a:t>24/01/2014</a:t>
             </a:fld>
             <a:endParaRPr lang="en-CA"/>
           </a:p>
@@ -644,7 +644,7 @@
           <a:p>
             <a:fld id="{9EDD12FB-CA2E-40E7-86FF-113E71947391}" type="datetimeFigureOut">
               <a:rPr lang="en-CA" smtClean="0"/>
-              <a:t>22/01/2014</a:t>
+              <a:t>24/01/2014</a:t>
             </a:fld>
             <a:endParaRPr lang="en-CA"/>
           </a:p>
@@ -814,7 +814,7 @@
           <a:p>
             <a:fld id="{9EDD12FB-CA2E-40E7-86FF-113E71947391}" type="datetimeFigureOut">
               <a:rPr lang="en-CA" smtClean="0"/>
-              <a:t>22/01/2014</a:t>
+              <a:t>24/01/2014</a:t>
             </a:fld>
             <a:endParaRPr lang="en-CA"/>
           </a:p>
@@ -1060,7 +1060,7 @@
           <a:p>
             <a:fld id="{9EDD12FB-CA2E-40E7-86FF-113E71947391}" type="datetimeFigureOut">
               <a:rPr lang="en-CA" smtClean="0"/>
-              <a:t>22/01/2014</a:t>
+              <a:t>24/01/2014</a:t>
             </a:fld>
             <a:endParaRPr lang="en-CA"/>
           </a:p>
@@ -1348,7 +1348,7 @@
           <a:p>
             <a:fld id="{9EDD12FB-CA2E-40E7-86FF-113E71947391}" type="datetimeFigureOut">
               <a:rPr lang="en-CA" smtClean="0"/>
-              <a:t>22/01/2014</a:t>
+              <a:t>24/01/2014</a:t>
             </a:fld>
             <a:endParaRPr lang="en-CA"/>
           </a:p>
@@ -1770,7 +1770,7 @@
           <a:p>
             <a:fld id="{9EDD12FB-CA2E-40E7-86FF-113E71947391}" type="datetimeFigureOut">
               <a:rPr lang="en-CA" smtClean="0"/>
-              <a:t>22/01/2014</a:t>
+              <a:t>24/01/2014</a:t>
             </a:fld>
             <a:endParaRPr lang="en-CA"/>
           </a:p>
@@ -1888,7 +1888,7 @@
           <a:p>
             <a:fld id="{9EDD12FB-CA2E-40E7-86FF-113E71947391}" type="datetimeFigureOut">
               <a:rPr lang="en-CA" smtClean="0"/>
-              <a:t>22/01/2014</a:t>
+              <a:t>24/01/2014</a:t>
             </a:fld>
             <a:endParaRPr lang="en-CA"/>
           </a:p>
@@ -1983,7 +1983,7 @@
           <a:p>
             <a:fld id="{9EDD12FB-CA2E-40E7-86FF-113E71947391}" type="datetimeFigureOut">
               <a:rPr lang="en-CA" smtClean="0"/>
-              <a:t>22/01/2014</a:t>
+              <a:t>24/01/2014</a:t>
             </a:fld>
             <a:endParaRPr lang="en-CA"/>
           </a:p>
@@ -2260,7 +2260,7 @@
           <a:p>
             <a:fld id="{9EDD12FB-CA2E-40E7-86FF-113E71947391}" type="datetimeFigureOut">
               <a:rPr lang="en-CA" smtClean="0"/>
-              <a:t>22/01/2014</a:t>
+              <a:t>24/01/2014</a:t>
             </a:fld>
             <a:endParaRPr lang="en-CA"/>
           </a:p>
@@ -2513,7 +2513,7 @@
           <a:p>
             <a:fld id="{9EDD12FB-CA2E-40E7-86FF-113E71947391}" type="datetimeFigureOut">
               <a:rPr lang="en-CA" smtClean="0"/>
-              <a:t>22/01/2014</a:t>
+              <a:t>24/01/2014</a:t>
             </a:fld>
             <a:endParaRPr lang="en-CA"/>
           </a:p>
@@ -2726,7 +2726,7 @@
           <a:p>
             <a:fld id="{9EDD12FB-CA2E-40E7-86FF-113E71947391}" type="datetimeFigureOut">
               <a:rPr lang="en-CA" smtClean="0"/>
-              <a:t>22/01/2014</a:t>
+              <a:t>24/01/2014</a:t>
             </a:fld>
             <a:endParaRPr lang="en-CA"/>
           </a:p>
@@ -3174,6 +3174,17 @@
           </a:p>
           <a:p>
             <a:r>
+              <a:rPr lang="en-CA" u="sng" dirty="0">
+                <a:solidFill>
+                  <a:srgbClr val="EDEDED"/>
+                </a:solidFill>
+                <a:latin typeface="Verdana" panose="020B0604030504040204" pitchFamily="34" charset="0"/>
+                <a:ea typeface="Verdana" panose="020B0604030504040204" pitchFamily="34" charset="0"/>
+                <a:cs typeface="Verdana" panose="020B0604030504040204" pitchFamily="34" charset="0"/>
+              </a:rPr>
+              <a:t>d</a:t>
+            </a:r>
+            <a:r>
               <a:rPr lang="en-CA" u="sng" dirty="0" smtClean="0">
                 <a:solidFill>
                   <a:srgbClr val="EDEDED"/>
@@ -3182,8 +3193,16 @@
                 <a:ea typeface="Verdana" panose="020B0604030504040204" pitchFamily="34" charset="0"/>
                 <a:cs typeface="Verdana" panose="020B0604030504040204" pitchFamily="34" charset="0"/>
               </a:rPr>
-              <a:t>dragging direction</a:t>
-            </a:r>
+              <a:t>irection to drag in</a:t>
+            </a:r>
+            <a:endParaRPr lang="en-CA" u="sng" dirty="0" smtClean="0">
+              <a:solidFill>
+                <a:srgbClr val="EDEDED"/>
+              </a:solidFill>
+              <a:latin typeface="Verdana" panose="020B0604030504040204" pitchFamily="34" charset="0"/>
+              <a:ea typeface="Verdana" panose="020B0604030504040204" pitchFamily="34" charset="0"/>
+              <a:cs typeface="Verdana" panose="020B0604030504040204" pitchFamily="34" charset="0"/>
+            </a:endParaRPr>
           </a:p>
           <a:p>
             <a:r>
@@ -3431,6 +3450,108 @@
           </a:fontRef>
         </p:style>
       </p:cxnSp>
+      <p:sp>
+        <p:nvSpPr>
+          <p:cNvPr id="10" name="TextBox 9"/>
+          <p:cNvSpPr txBox="1"/>
+          <p:nvPr/>
+        </p:nvSpPr>
+        <p:spPr>
+          <a:xfrm>
+            <a:off x="0" y="116632"/>
+            <a:ext cx="7039941" cy="400110"/>
+          </a:xfrm>
+          <a:prstGeom prst="rect">
+            <a:avLst/>
+          </a:prstGeom>
+          <a:noFill/>
+        </p:spPr>
+        <p:txBody>
+          <a:bodyPr wrap="none" rtlCol="0">
+            <a:spAutoFit/>
+          </a:bodyPr>
+          <a:lstStyle/>
+          <a:p>
+            <a:r>
+              <a:rPr lang="en-CA" sz="2000" dirty="0" smtClean="0">
+                <a:solidFill>
+                  <a:srgbClr val="EDEDED"/>
+                </a:solidFill>
+                <a:latin typeface="Verdana" panose="020B0604030504040204" pitchFamily="34" charset="0"/>
+                <a:ea typeface="Verdana" panose="020B0604030504040204" pitchFamily="34" charset="0"/>
+                <a:cs typeface="Verdana" panose="020B0604030504040204" pitchFamily="34" charset="0"/>
+              </a:rPr>
+              <a:t>Drag the bars to move forward and backward in time</a:t>
+            </a:r>
+            <a:endParaRPr lang="en-CA" sz="2000" u="sng" dirty="0">
+              <a:solidFill>
+                <a:srgbClr val="EDEDED"/>
+              </a:solidFill>
+              <a:latin typeface="Verdana" panose="020B0604030504040204" pitchFamily="34" charset="0"/>
+              <a:ea typeface="Verdana" panose="020B0604030504040204" pitchFamily="34" charset="0"/>
+              <a:cs typeface="Verdana" panose="020B0604030504040204" pitchFamily="34" charset="0"/>
+            </a:endParaRPr>
+          </a:p>
+        </p:txBody>
+      </p:sp>
+      <p:sp>
+        <p:nvSpPr>
+          <p:cNvPr id="11" name="TextBox 10"/>
+          <p:cNvSpPr txBox="1"/>
+          <p:nvPr/>
+        </p:nvSpPr>
+        <p:spPr>
+          <a:xfrm>
+            <a:off x="114952" y="4365104"/>
+            <a:ext cx="4817088" cy="400110"/>
+          </a:xfrm>
+          <a:prstGeom prst="rect">
+            <a:avLst/>
+          </a:prstGeom>
+          <a:noFill/>
+        </p:spPr>
+        <p:txBody>
+          <a:bodyPr wrap="none" rtlCol="0">
+            <a:spAutoFit/>
+          </a:bodyPr>
+          <a:lstStyle/>
+          <a:p>
+            <a:r>
+              <a:rPr lang="en-CA" sz="2000" dirty="0" smtClean="0">
+                <a:solidFill>
+                  <a:srgbClr val="EDEDED"/>
+                </a:solidFill>
+                <a:latin typeface="Verdana" panose="020B0604030504040204" pitchFamily="34" charset="0"/>
+                <a:ea typeface="Verdana" panose="020B0604030504040204" pitchFamily="34" charset="0"/>
+                <a:cs typeface="Verdana" panose="020B0604030504040204" pitchFamily="34" charset="0"/>
+              </a:rPr>
+              <a:t>Drag the </a:t>
+            </a:r>
+            <a:r>
+              <a:rPr lang="en-CA" sz="2000" dirty="0" smtClean="0">
+                <a:solidFill>
+                  <a:srgbClr val="D95F02"/>
+                </a:solidFill>
+                <a:latin typeface="Verdana" panose="020B0604030504040204" pitchFamily="34" charset="0"/>
+                <a:ea typeface="Verdana" panose="020B0604030504040204" pitchFamily="34" charset="0"/>
+                <a:cs typeface="Verdana" panose="020B0604030504040204" pitchFamily="34" charset="0"/>
+              </a:rPr>
+              <a:t>orange bar </a:t>
+            </a:r>
+            <a:r>
+              <a:rPr lang="en-CA" sz="2000" dirty="0" smtClean="0">
+                <a:solidFill>
+                  <a:srgbClr val="EDEDED"/>
+                </a:solidFill>
+                <a:latin typeface="Verdana" panose="020B0604030504040204" pitchFamily="34" charset="0"/>
+                <a:ea typeface="Verdana" panose="020B0604030504040204" pitchFamily="34" charset="0"/>
+                <a:cs typeface="Verdana" panose="020B0604030504040204" pitchFamily="34" charset="0"/>
+              </a:rPr>
+              <a:t>above to try it!</a:t>
+            </a:r>
+          </a:p>
+        </p:txBody>
+      </p:sp>
     </p:spTree>
     <p:extLst>
       <p:ext uri="{BB962C8B-B14F-4D97-AF65-F5344CB8AC3E}">
@@ -3777,6 +3898,72 @@
           </a:fontRef>
         </p:style>
       </p:cxnSp>
+      <p:sp>
+        <p:nvSpPr>
+          <p:cNvPr id="9" name="TextBox 8"/>
+          <p:cNvSpPr txBox="1"/>
+          <p:nvPr/>
+        </p:nvSpPr>
+        <p:spPr>
+          <a:xfrm>
+            <a:off x="158600" y="3212976"/>
+            <a:ext cx="4679904" cy="400110"/>
+          </a:xfrm>
+          <a:prstGeom prst="rect">
+            <a:avLst/>
+          </a:prstGeom>
+          <a:noFill/>
+        </p:spPr>
+        <p:txBody>
+          <a:bodyPr wrap="square" rtlCol="0">
+            <a:spAutoFit/>
+          </a:bodyPr>
+          <a:lstStyle/>
+          <a:p>
+            <a:r>
+              <a:rPr lang="en-CA" sz="2000" dirty="0" smtClean="0">
+                <a:solidFill>
+                  <a:srgbClr val="EDEDED"/>
+                </a:solidFill>
+                <a:latin typeface="Verdana" panose="020B0604030504040204" pitchFamily="34" charset="0"/>
+                <a:ea typeface="Verdana" panose="020B0604030504040204" pitchFamily="34" charset="0"/>
+                <a:cs typeface="Verdana" panose="020B0604030504040204" pitchFamily="34" charset="0"/>
+              </a:rPr>
+              <a:t>Drag the </a:t>
+            </a:r>
+            <a:r>
+              <a:rPr lang="en-CA" sz="2000" dirty="0" smtClean="0">
+                <a:solidFill>
+                  <a:srgbClr val="1B9E77"/>
+                </a:solidFill>
+                <a:latin typeface="Verdana" panose="020B0604030504040204" pitchFamily="34" charset="0"/>
+                <a:ea typeface="Verdana" panose="020B0604030504040204" pitchFamily="34" charset="0"/>
+                <a:cs typeface="Verdana" panose="020B0604030504040204" pitchFamily="34" charset="0"/>
+              </a:rPr>
+              <a:t>green bar </a:t>
+            </a:r>
+            <a:r>
+              <a:rPr lang="en-CA" sz="2000" dirty="0" smtClean="0">
+                <a:solidFill>
+                  <a:srgbClr val="EDEDED"/>
+                </a:solidFill>
+                <a:latin typeface="Verdana" panose="020B0604030504040204" pitchFamily="34" charset="0"/>
+                <a:ea typeface="Verdana" panose="020B0604030504040204" pitchFamily="34" charset="0"/>
+                <a:cs typeface="Verdana" panose="020B0604030504040204" pitchFamily="34" charset="0"/>
+              </a:rPr>
+              <a:t>above to try it!</a:t>
+            </a:r>
+            <a:endParaRPr lang="en-CA" sz="2000" u="sng" dirty="0">
+              <a:solidFill>
+                <a:srgbClr val="EDEDED"/>
+              </a:solidFill>
+              <a:latin typeface="Verdana" panose="020B0604030504040204" pitchFamily="34" charset="0"/>
+              <a:ea typeface="Verdana" panose="020B0604030504040204" pitchFamily="34" charset="0"/>
+              <a:cs typeface="Verdana" panose="020B0604030504040204" pitchFamily="34" charset="0"/>
+            </a:endParaRPr>
+          </a:p>
+        </p:txBody>
+      </p:sp>
     </p:spTree>
     <p:extLst>
       <p:ext uri="{BB962C8B-B14F-4D97-AF65-F5344CB8AC3E}">

</xml_diff>

<commit_message>
Added years to the partial hint paths of the scatterplot and barchart experiment
</commit_message>
<xml_diff>
--- a/d3 Prototyping/User Evaluation/client/BarchartExperiment/Images/partialHintPath.pptx
+++ b/d3 Prototyping/User Evaluation/client/BarchartExperiment/Images/partialHintPath.pptx
@@ -294,7 +294,7 @@
           <a:p>
             <a:fld id="{9EDD12FB-CA2E-40E7-86FF-113E71947391}" type="datetimeFigureOut">
               <a:rPr lang="en-CA" smtClean="0"/>
-              <a:t>24/01/2014</a:t>
+              <a:t>06/02/2014</a:t>
             </a:fld>
             <a:endParaRPr lang="en-CA"/>
           </a:p>
@@ -464,7 +464,7 @@
           <a:p>
             <a:fld id="{9EDD12FB-CA2E-40E7-86FF-113E71947391}" type="datetimeFigureOut">
               <a:rPr lang="en-CA" smtClean="0"/>
-              <a:t>24/01/2014</a:t>
+              <a:t>06/02/2014</a:t>
             </a:fld>
             <a:endParaRPr lang="en-CA"/>
           </a:p>
@@ -644,7 +644,7 @@
           <a:p>
             <a:fld id="{9EDD12FB-CA2E-40E7-86FF-113E71947391}" type="datetimeFigureOut">
               <a:rPr lang="en-CA" smtClean="0"/>
-              <a:t>24/01/2014</a:t>
+              <a:t>06/02/2014</a:t>
             </a:fld>
             <a:endParaRPr lang="en-CA"/>
           </a:p>
@@ -814,7 +814,7 @@
           <a:p>
             <a:fld id="{9EDD12FB-CA2E-40E7-86FF-113E71947391}" type="datetimeFigureOut">
               <a:rPr lang="en-CA" smtClean="0"/>
-              <a:t>24/01/2014</a:t>
+              <a:t>06/02/2014</a:t>
             </a:fld>
             <a:endParaRPr lang="en-CA"/>
           </a:p>
@@ -1060,7 +1060,7 @@
           <a:p>
             <a:fld id="{9EDD12FB-CA2E-40E7-86FF-113E71947391}" type="datetimeFigureOut">
               <a:rPr lang="en-CA" smtClean="0"/>
-              <a:t>24/01/2014</a:t>
+              <a:t>06/02/2014</a:t>
             </a:fld>
             <a:endParaRPr lang="en-CA"/>
           </a:p>
@@ -1348,7 +1348,7 @@
           <a:p>
             <a:fld id="{9EDD12FB-CA2E-40E7-86FF-113E71947391}" type="datetimeFigureOut">
               <a:rPr lang="en-CA" smtClean="0"/>
-              <a:t>24/01/2014</a:t>
+              <a:t>06/02/2014</a:t>
             </a:fld>
             <a:endParaRPr lang="en-CA"/>
           </a:p>
@@ -1770,7 +1770,7 @@
           <a:p>
             <a:fld id="{9EDD12FB-CA2E-40E7-86FF-113E71947391}" type="datetimeFigureOut">
               <a:rPr lang="en-CA" smtClean="0"/>
-              <a:t>24/01/2014</a:t>
+              <a:t>06/02/2014</a:t>
             </a:fld>
             <a:endParaRPr lang="en-CA"/>
           </a:p>
@@ -1888,7 +1888,7 @@
           <a:p>
             <a:fld id="{9EDD12FB-CA2E-40E7-86FF-113E71947391}" type="datetimeFigureOut">
               <a:rPr lang="en-CA" smtClean="0"/>
-              <a:t>24/01/2014</a:t>
+              <a:t>06/02/2014</a:t>
             </a:fld>
             <a:endParaRPr lang="en-CA"/>
           </a:p>
@@ -1983,7 +1983,7 @@
           <a:p>
             <a:fld id="{9EDD12FB-CA2E-40E7-86FF-113E71947391}" type="datetimeFigureOut">
               <a:rPr lang="en-CA" smtClean="0"/>
-              <a:t>24/01/2014</a:t>
+              <a:t>06/02/2014</a:t>
             </a:fld>
             <a:endParaRPr lang="en-CA"/>
           </a:p>
@@ -2260,7 +2260,7 @@
           <a:p>
             <a:fld id="{9EDD12FB-CA2E-40E7-86FF-113E71947391}" type="datetimeFigureOut">
               <a:rPr lang="en-CA" smtClean="0"/>
-              <a:t>24/01/2014</a:t>
+              <a:t>06/02/2014</a:t>
             </a:fld>
             <a:endParaRPr lang="en-CA"/>
           </a:p>
@@ -2513,7 +2513,7 @@
           <a:p>
             <a:fld id="{9EDD12FB-CA2E-40E7-86FF-113E71947391}" type="datetimeFigureOut">
               <a:rPr lang="en-CA" smtClean="0"/>
-              <a:t>24/01/2014</a:t>
+              <a:t>06/02/2014</a:t>
             </a:fld>
             <a:endParaRPr lang="en-CA"/>
           </a:p>
@@ -2726,7 +2726,7 @@
           <a:p>
             <a:fld id="{9EDD12FB-CA2E-40E7-86FF-113E71947391}" type="datetimeFigureOut">
               <a:rPr lang="en-CA" smtClean="0"/>
-              <a:t>24/01/2014</a:t>
+              <a:t>06/02/2014</a:t>
             </a:fld>
             <a:endParaRPr lang="en-CA"/>
           </a:p>
@@ -3195,14 +3195,6 @@
               </a:rPr>
               <a:t>irection to drag in</a:t>
             </a:r>
-            <a:endParaRPr lang="en-CA" u="sng" dirty="0" smtClean="0">
-              <a:solidFill>
-                <a:srgbClr val="EDEDED"/>
-              </a:solidFill>
-              <a:latin typeface="Verdana" panose="020B0604030504040204" pitchFamily="34" charset="0"/>
-              <a:ea typeface="Verdana" panose="020B0604030504040204" pitchFamily="34" charset="0"/>
-              <a:cs typeface="Verdana" panose="020B0604030504040204" pitchFamily="34" charset="0"/>
-            </a:endParaRPr>
           </a:p>
           <a:p>
             <a:r>
@@ -3503,7 +3495,7 @@
         <p:spPr>
           <a:xfrm>
             <a:off x="114952" y="4365104"/>
-            <a:ext cx="4817088" cy="400110"/>
+            <a:ext cx="3598486" cy="400110"/>
           </a:xfrm>
           <a:prstGeom prst="rect">
             <a:avLst/>
@@ -3525,29 +3517,7 @@
                 <a:ea typeface="Verdana" panose="020B0604030504040204" pitchFamily="34" charset="0"/>
                 <a:cs typeface="Verdana" panose="020B0604030504040204" pitchFamily="34" charset="0"/>
               </a:rPr>
-              <a:t>Drag the </a:t>
-            </a:r>
-            <a:r>
-              <a:rPr lang="en-CA" sz="2000" dirty="0" smtClean="0">
-                <a:solidFill>
-                  <a:srgbClr val="D95F02"/>
-                </a:solidFill>
-                <a:latin typeface="Verdana" panose="020B0604030504040204" pitchFamily="34" charset="0"/>
-                <a:ea typeface="Verdana" panose="020B0604030504040204" pitchFamily="34" charset="0"/>
-                <a:cs typeface="Verdana" panose="020B0604030504040204" pitchFamily="34" charset="0"/>
-              </a:rPr>
-              <a:t>orange bar </a:t>
-            </a:r>
-            <a:r>
-              <a:rPr lang="en-CA" sz="2000" dirty="0" smtClean="0">
-                <a:solidFill>
-                  <a:srgbClr val="EDEDED"/>
-                </a:solidFill>
-                <a:latin typeface="Verdana" panose="020B0604030504040204" pitchFamily="34" charset="0"/>
-                <a:ea typeface="Verdana" panose="020B0604030504040204" pitchFamily="34" charset="0"/>
-                <a:cs typeface="Verdana" panose="020B0604030504040204" pitchFamily="34" charset="0"/>
-              </a:rPr>
-              <a:t>above to try it!</a:t>
+              <a:t>Drag bar A above to try it!</a:t>
             </a:r>
           </a:p>
         </p:txBody>
@@ -3929,29 +3899,7 @@
                 <a:ea typeface="Verdana" panose="020B0604030504040204" pitchFamily="34" charset="0"/>
                 <a:cs typeface="Verdana" panose="020B0604030504040204" pitchFamily="34" charset="0"/>
               </a:rPr>
-              <a:t>Drag the </a:t>
-            </a:r>
-            <a:r>
-              <a:rPr lang="en-CA" sz="2000" dirty="0" smtClean="0">
-                <a:solidFill>
-                  <a:srgbClr val="1B9E77"/>
-                </a:solidFill>
-                <a:latin typeface="Verdana" panose="020B0604030504040204" pitchFamily="34" charset="0"/>
-                <a:ea typeface="Verdana" panose="020B0604030504040204" pitchFamily="34" charset="0"/>
-                <a:cs typeface="Verdana" panose="020B0604030504040204" pitchFamily="34" charset="0"/>
-              </a:rPr>
-              <a:t>green bar </a:t>
-            </a:r>
-            <a:r>
-              <a:rPr lang="en-CA" sz="2000" dirty="0" smtClean="0">
-                <a:solidFill>
-                  <a:srgbClr val="EDEDED"/>
-                </a:solidFill>
-                <a:latin typeface="Verdana" panose="020B0604030504040204" pitchFamily="34" charset="0"/>
-                <a:ea typeface="Verdana" panose="020B0604030504040204" pitchFamily="34" charset="0"/>
-                <a:cs typeface="Verdana" panose="020B0604030504040204" pitchFamily="34" charset="0"/>
-              </a:rPr>
-              <a:t>above to try it!</a:t>
+              <a:t>Drag bar B above to try it!</a:t>
             </a:r>
             <a:endParaRPr lang="en-CA" sz="2000" u="sng" dirty="0">
               <a:solidFill>
@@ -4040,8 +3988,8 @@
         </p:nvSpPr>
         <p:spPr>
           <a:xfrm>
-            <a:off x="22106" y="692696"/>
-            <a:ext cx="3327065" cy="923330"/>
+            <a:off x="55756" y="134210"/>
+            <a:ext cx="3930884" cy="923330"/>
           </a:xfrm>
           <a:prstGeom prst="rect">
             <a:avLst/>
@@ -4063,10 +4011,8 @@
                 <a:ea typeface="Verdana" panose="020B0604030504040204" pitchFamily="34" charset="0"/>
                 <a:cs typeface="Verdana" panose="020B0604030504040204" pitchFamily="34" charset="0"/>
               </a:rPr>
-              <a:t>Click any year on the path </a:t>
-            </a:r>
-          </a:p>
-          <a:p>
+              <a:t>These paths show </a:t>
+            </a:r>
             <a:r>
               <a:rPr lang="en-CA" dirty="0" smtClean="0">
                 <a:solidFill>
@@ -4076,8 +4022,200 @@
                 <a:ea typeface="Verdana" panose="020B0604030504040204" pitchFamily="34" charset="0"/>
                 <a:cs typeface="Verdana" panose="020B0604030504040204" pitchFamily="34" charset="0"/>
               </a:rPr>
-              <a:t>to go directly to that year</a:t>
-            </a:r>
+              <a:t>all heights of </a:t>
+            </a:r>
+          </a:p>
+          <a:p>
+            <a:r>
+              <a:rPr lang="en-CA" dirty="0">
+                <a:solidFill>
+                  <a:srgbClr val="EDEDED"/>
+                </a:solidFill>
+                <a:latin typeface="Verdana" panose="020B0604030504040204" pitchFamily="34" charset="0"/>
+                <a:ea typeface="Verdana" panose="020B0604030504040204" pitchFamily="34" charset="0"/>
+                <a:cs typeface="Verdana" panose="020B0604030504040204" pitchFamily="34" charset="0"/>
+              </a:rPr>
+              <a:t>a</a:t>
+            </a:r>
+            <a:r>
+              <a:rPr lang="en-CA" dirty="0" smtClean="0">
+                <a:solidFill>
+                  <a:srgbClr val="EDEDED"/>
+                </a:solidFill>
+                <a:latin typeface="Verdana" panose="020B0604030504040204" pitchFamily="34" charset="0"/>
+                <a:ea typeface="Verdana" panose="020B0604030504040204" pitchFamily="34" charset="0"/>
+                <a:cs typeface="Verdana" panose="020B0604030504040204" pitchFamily="34" charset="0"/>
+              </a:rPr>
+              <a:t> bar at e</a:t>
+            </a:r>
+            <a:r>
+              <a:rPr lang="en-CA" dirty="0" smtClean="0">
+                <a:solidFill>
+                  <a:srgbClr val="EDEDED"/>
+                </a:solidFill>
+                <a:latin typeface="Verdana" panose="020B0604030504040204" pitchFamily="34" charset="0"/>
+                <a:ea typeface="Verdana" panose="020B0604030504040204" pitchFamily="34" charset="0"/>
+                <a:cs typeface="Verdana" panose="020B0604030504040204" pitchFamily="34" charset="0"/>
+              </a:rPr>
+              <a:t>ach year</a:t>
+            </a:r>
+            <a:endParaRPr lang="en-CA" dirty="0" smtClean="0">
+              <a:solidFill>
+                <a:srgbClr val="EDEDED"/>
+              </a:solidFill>
+              <a:latin typeface="Verdana" panose="020B0604030504040204" pitchFamily="34" charset="0"/>
+              <a:ea typeface="Verdana" panose="020B0604030504040204" pitchFamily="34" charset="0"/>
+              <a:cs typeface="Verdana" panose="020B0604030504040204" pitchFamily="34" charset="0"/>
+            </a:endParaRPr>
+          </a:p>
+          <a:p>
+            <a:endParaRPr lang="en-CA" u="sng" dirty="0">
+              <a:solidFill>
+                <a:srgbClr val="EDEDED"/>
+              </a:solidFill>
+              <a:latin typeface="Verdana" panose="020B0604030504040204" pitchFamily="34" charset="0"/>
+              <a:ea typeface="Verdana" panose="020B0604030504040204" pitchFamily="34" charset="0"/>
+              <a:cs typeface="Verdana" panose="020B0604030504040204" pitchFamily="34" charset="0"/>
+            </a:endParaRPr>
+          </a:p>
+        </p:txBody>
+      </p:sp>
+      <p:cxnSp>
+        <p:nvCxnSpPr>
+          <p:cNvPr id="4" name="Straight Arrow Connector 3"/>
+          <p:cNvCxnSpPr/>
+          <p:nvPr/>
+        </p:nvCxnSpPr>
+        <p:spPr>
+          <a:xfrm flipH="1">
+            <a:off x="2411760" y="2780928"/>
+            <a:ext cx="1100475" cy="0"/>
+          </a:xfrm>
+          <a:prstGeom prst="straightConnector1">
+            <a:avLst/>
+          </a:prstGeom>
+          <a:ln w="12700">
+            <a:solidFill>
+              <a:srgbClr val="EDEDED"/>
+            </a:solidFill>
+            <a:tailEnd type="arrow"/>
+          </a:ln>
+        </p:spPr>
+        <p:style>
+          <a:lnRef idx="1">
+            <a:schemeClr val="accent1"/>
+          </a:lnRef>
+          <a:fillRef idx="0">
+            <a:schemeClr val="accent1"/>
+          </a:fillRef>
+          <a:effectRef idx="0">
+            <a:schemeClr val="accent1"/>
+          </a:effectRef>
+          <a:fontRef idx="minor">
+            <a:schemeClr val="tx1"/>
+          </a:fontRef>
+        </p:style>
+      </p:cxnSp>
+      <p:cxnSp>
+        <p:nvCxnSpPr>
+          <p:cNvPr id="7" name="Straight Connector 6"/>
+          <p:cNvCxnSpPr/>
+          <p:nvPr/>
+        </p:nvCxnSpPr>
+        <p:spPr>
+          <a:xfrm flipV="1">
+            <a:off x="3516727" y="2780928"/>
+            <a:ext cx="0" cy="936104"/>
+          </a:xfrm>
+          <a:prstGeom prst="line">
+            <a:avLst/>
+          </a:prstGeom>
+          <a:ln w="12700">
+            <a:solidFill>
+              <a:srgbClr val="EDEDED"/>
+            </a:solidFill>
+          </a:ln>
+        </p:spPr>
+        <p:style>
+          <a:lnRef idx="1">
+            <a:schemeClr val="accent1"/>
+          </a:lnRef>
+          <a:fillRef idx="0">
+            <a:schemeClr val="accent1"/>
+          </a:fillRef>
+          <a:effectRef idx="0">
+            <a:schemeClr val="accent1"/>
+          </a:effectRef>
+          <a:fontRef idx="minor">
+            <a:schemeClr val="tx1"/>
+          </a:fontRef>
+        </p:style>
+      </p:cxnSp>
+      <p:sp>
+        <p:nvSpPr>
+          <p:cNvPr id="8" name="TextBox 7"/>
+          <p:cNvSpPr txBox="1"/>
+          <p:nvPr/>
+        </p:nvSpPr>
+        <p:spPr>
+          <a:xfrm>
+            <a:off x="1900964" y="3742640"/>
+            <a:ext cx="4541308" cy="923330"/>
+          </a:xfrm>
+          <a:prstGeom prst="rect">
+            <a:avLst/>
+          </a:prstGeom>
+          <a:noFill/>
+        </p:spPr>
+        <p:txBody>
+          <a:bodyPr wrap="none" rtlCol="0">
+            <a:spAutoFit/>
+          </a:bodyPr>
+          <a:lstStyle/>
+          <a:p>
+            <a:r>
+              <a:rPr lang="en-CA" dirty="0" smtClean="0">
+                <a:solidFill>
+                  <a:srgbClr val="EDEDED"/>
+                </a:solidFill>
+                <a:latin typeface="Verdana" panose="020B0604030504040204" pitchFamily="34" charset="0"/>
+                <a:ea typeface="Verdana" panose="020B0604030504040204" pitchFamily="34" charset="0"/>
+                <a:cs typeface="Verdana" panose="020B0604030504040204" pitchFamily="34" charset="0"/>
+              </a:rPr>
+              <a:t>“Fast forward” in time by tapping any</a:t>
+            </a:r>
+          </a:p>
+          <a:p>
+            <a:r>
+              <a:rPr lang="en-CA" dirty="0">
+                <a:solidFill>
+                  <a:srgbClr val="EDEDED"/>
+                </a:solidFill>
+                <a:latin typeface="Verdana" panose="020B0604030504040204" pitchFamily="34" charset="0"/>
+                <a:ea typeface="Verdana" panose="020B0604030504040204" pitchFamily="34" charset="0"/>
+                <a:cs typeface="Verdana" panose="020B0604030504040204" pitchFamily="34" charset="0"/>
+              </a:rPr>
+              <a:t>y</a:t>
+            </a:r>
+            <a:r>
+              <a:rPr lang="en-CA" dirty="0" smtClean="0">
+                <a:solidFill>
+                  <a:srgbClr val="EDEDED"/>
+                </a:solidFill>
+                <a:latin typeface="Verdana" panose="020B0604030504040204" pitchFamily="34" charset="0"/>
+                <a:ea typeface="Verdana" panose="020B0604030504040204" pitchFamily="34" charset="0"/>
+                <a:cs typeface="Verdana" panose="020B0604030504040204" pitchFamily="34" charset="0"/>
+              </a:rPr>
+              <a:t>ear to go directly to that year.</a:t>
+            </a:r>
+            <a:endParaRPr lang="en-CA" dirty="0" smtClean="0">
+              <a:solidFill>
+                <a:srgbClr val="EDEDED"/>
+              </a:solidFill>
+              <a:latin typeface="Verdana" panose="020B0604030504040204" pitchFamily="34" charset="0"/>
+              <a:ea typeface="Verdana" panose="020B0604030504040204" pitchFamily="34" charset="0"/>
+              <a:cs typeface="Verdana" panose="020B0604030504040204" pitchFamily="34" charset="0"/>
+            </a:endParaRPr>
           </a:p>
           <a:p>
             <a:endParaRPr lang="en-CA" u="sng" dirty="0">

</xml_diff>